<commit_message>
Update quality data and pres
</commit_message>
<xml_diff>
--- a/doc/thesis/Presentation/Thesis_presentation.pptx
+++ b/doc/thesis/Presentation/Thesis_presentation.pptx
@@ -7,13 +7,17 @@
   <p:sldIdLst>
     <p:sldId id="256" r:id="rId2"/>
     <p:sldId id="257" r:id="rId3"/>
-    <p:sldId id="258" r:id="rId4"/>
-    <p:sldId id="259" r:id="rId5"/>
-    <p:sldId id="260" r:id="rId6"/>
-    <p:sldId id="261" r:id="rId7"/>
-    <p:sldId id="262" r:id="rId8"/>
-    <p:sldId id="263" r:id="rId9"/>
-    <p:sldId id="264" r:id="rId10"/>
+    <p:sldId id="265" r:id="rId4"/>
+    <p:sldId id="258" r:id="rId5"/>
+    <p:sldId id="266" r:id="rId6"/>
+    <p:sldId id="267" r:id="rId7"/>
+    <p:sldId id="268" r:id="rId8"/>
+    <p:sldId id="269" r:id="rId9"/>
+    <p:sldId id="260" r:id="rId10"/>
+    <p:sldId id="261" r:id="rId11"/>
+    <p:sldId id="262" r:id="rId12"/>
+    <p:sldId id="263" r:id="rId13"/>
+    <p:sldId id="264" r:id="rId14"/>
   </p:sldIdLst>
   <p:sldSz cx="12192000" cy="6858000"/>
   <p:notesSz cx="6858000" cy="9144000"/>
@@ -251,7 +255,7 @@
           <a:p>
             <a:fld id="{763F7E3C-F070-438F-982D-66A47D421027}" type="datetimeFigureOut">
               <a:rPr lang="de-DE" smtClean="0"/>
-              <a:t>12.02.2020</a:t>
+              <a:t>13.02.2020</a:t>
             </a:fld>
             <a:endParaRPr lang="de-DE"/>
           </a:p>
@@ -293,7 +297,7 @@
           <a:p>
             <a:fld id="{CB9E609B-8018-417F-A0D4-47DD4FF48DA6}" type="slidenum">
               <a:rPr lang="de-DE" smtClean="0"/>
-              <a:t>‹Nr.›</a:t>
+              <a:t>‹#›</a:t>
             </a:fld>
             <a:endParaRPr lang="de-DE"/>
           </a:p>
@@ -421,7 +425,7 @@
           <a:p>
             <a:fld id="{763F7E3C-F070-438F-982D-66A47D421027}" type="datetimeFigureOut">
               <a:rPr lang="de-DE" smtClean="0"/>
-              <a:t>12.02.2020</a:t>
+              <a:t>13.02.2020</a:t>
             </a:fld>
             <a:endParaRPr lang="de-DE"/>
           </a:p>
@@ -463,7 +467,7 @@
           <a:p>
             <a:fld id="{CB9E609B-8018-417F-A0D4-47DD4FF48DA6}" type="slidenum">
               <a:rPr lang="de-DE" smtClean="0"/>
-              <a:t>‹Nr.›</a:t>
+              <a:t>‹#›</a:t>
             </a:fld>
             <a:endParaRPr lang="de-DE"/>
           </a:p>
@@ -601,7 +605,7 @@
           <a:p>
             <a:fld id="{763F7E3C-F070-438F-982D-66A47D421027}" type="datetimeFigureOut">
               <a:rPr lang="de-DE" smtClean="0"/>
-              <a:t>12.02.2020</a:t>
+              <a:t>13.02.2020</a:t>
             </a:fld>
             <a:endParaRPr lang="de-DE"/>
           </a:p>
@@ -643,7 +647,7 @@
           <a:p>
             <a:fld id="{CB9E609B-8018-417F-A0D4-47DD4FF48DA6}" type="slidenum">
               <a:rPr lang="de-DE" smtClean="0"/>
-              <a:t>‹Nr.›</a:t>
+              <a:t>‹#›</a:t>
             </a:fld>
             <a:endParaRPr lang="de-DE"/>
           </a:p>
@@ -771,7 +775,7 @@
           <a:p>
             <a:fld id="{763F7E3C-F070-438F-982D-66A47D421027}" type="datetimeFigureOut">
               <a:rPr lang="de-DE" smtClean="0"/>
-              <a:t>12.02.2020</a:t>
+              <a:t>13.02.2020</a:t>
             </a:fld>
             <a:endParaRPr lang="de-DE"/>
           </a:p>
@@ -813,7 +817,7 @@
           <a:p>
             <a:fld id="{CB9E609B-8018-417F-A0D4-47DD4FF48DA6}" type="slidenum">
               <a:rPr lang="de-DE" smtClean="0"/>
-              <a:t>‹Nr.›</a:t>
+              <a:t>‹#›</a:t>
             </a:fld>
             <a:endParaRPr lang="de-DE"/>
           </a:p>
@@ -1017,7 +1021,7 @@
           <a:p>
             <a:fld id="{763F7E3C-F070-438F-982D-66A47D421027}" type="datetimeFigureOut">
               <a:rPr lang="de-DE" smtClean="0"/>
-              <a:t>12.02.2020</a:t>
+              <a:t>13.02.2020</a:t>
             </a:fld>
             <a:endParaRPr lang="de-DE"/>
           </a:p>
@@ -1059,7 +1063,7 @@
           <a:p>
             <a:fld id="{CB9E609B-8018-417F-A0D4-47DD4FF48DA6}" type="slidenum">
               <a:rPr lang="de-DE" smtClean="0"/>
-              <a:t>‹Nr.›</a:t>
+              <a:t>‹#›</a:t>
             </a:fld>
             <a:endParaRPr lang="de-DE"/>
           </a:p>
@@ -1249,7 +1253,7 @@
           <a:p>
             <a:fld id="{763F7E3C-F070-438F-982D-66A47D421027}" type="datetimeFigureOut">
               <a:rPr lang="de-DE" smtClean="0"/>
-              <a:t>12.02.2020</a:t>
+              <a:t>13.02.2020</a:t>
             </a:fld>
             <a:endParaRPr lang="de-DE"/>
           </a:p>
@@ -1291,7 +1295,7 @@
           <a:p>
             <a:fld id="{CB9E609B-8018-417F-A0D4-47DD4FF48DA6}" type="slidenum">
               <a:rPr lang="de-DE" smtClean="0"/>
-              <a:t>‹Nr.›</a:t>
+              <a:t>‹#›</a:t>
             </a:fld>
             <a:endParaRPr lang="de-DE"/>
           </a:p>
@@ -1616,7 +1620,7 @@
           <a:p>
             <a:fld id="{763F7E3C-F070-438F-982D-66A47D421027}" type="datetimeFigureOut">
               <a:rPr lang="de-DE" smtClean="0"/>
-              <a:t>12.02.2020</a:t>
+              <a:t>13.02.2020</a:t>
             </a:fld>
             <a:endParaRPr lang="de-DE"/>
           </a:p>
@@ -1658,7 +1662,7 @@
           <a:p>
             <a:fld id="{CB9E609B-8018-417F-A0D4-47DD4FF48DA6}" type="slidenum">
               <a:rPr lang="de-DE" smtClean="0"/>
-              <a:t>‹Nr.›</a:t>
+              <a:t>‹#›</a:t>
             </a:fld>
             <a:endParaRPr lang="de-DE"/>
           </a:p>
@@ -1734,7 +1738,7 @@
           <a:p>
             <a:fld id="{763F7E3C-F070-438F-982D-66A47D421027}" type="datetimeFigureOut">
               <a:rPr lang="de-DE" smtClean="0"/>
-              <a:t>12.02.2020</a:t>
+              <a:t>13.02.2020</a:t>
             </a:fld>
             <a:endParaRPr lang="de-DE"/>
           </a:p>
@@ -1776,7 +1780,7 @@
           <a:p>
             <a:fld id="{CB9E609B-8018-417F-A0D4-47DD4FF48DA6}" type="slidenum">
               <a:rPr lang="de-DE" smtClean="0"/>
-              <a:t>‹Nr.›</a:t>
+              <a:t>‹#›</a:t>
             </a:fld>
             <a:endParaRPr lang="de-DE"/>
           </a:p>
@@ -1829,7 +1833,7 @@
           <a:p>
             <a:fld id="{763F7E3C-F070-438F-982D-66A47D421027}" type="datetimeFigureOut">
               <a:rPr lang="de-DE" smtClean="0"/>
-              <a:t>12.02.2020</a:t>
+              <a:t>13.02.2020</a:t>
             </a:fld>
             <a:endParaRPr lang="de-DE"/>
           </a:p>
@@ -1871,7 +1875,7 @@
           <a:p>
             <a:fld id="{CB9E609B-8018-417F-A0D4-47DD4FF48DA6}" type="slidenum">
               <a:rPr lang="de-DE" smtClean="0"/>
-              <a:t>‹Nr.›</a:t>
+              <a:t>‹#›</a:t>
             </a:fld>
             <a:endParaRPr lang="de-DE"/>
           </a:p>
@@ -2106,7 +2110,7 @@
           <a:p>
             <a:fld id="{763F7E3C-F070-438F-982D-66A47D421027}" type="datetimeFigureOut">
               <a:rPr lang="de-DE" smtClean="0"/>
-              <a:t>12.02.2020</a:t>
+              <a:t>13.02.2020</a:t>
             </a:fld>
             <a:endParaRPr lang="de-DE"/>
           </a:p>
@@ -2148,7 +2152,7 @@
           <a:p>
             <a:fld id="{CB9E609B-8018-417F-A0D4-47DD4FF48DA6}" type="slidenum">
               <a:rPr lang="de-DE" smtClean="0"/>
-              <a:t>‹Nr.›</a:t>
+              <a:t>‹#›</a:t>
             </a:fld>
             <a:endParaRPr lang="de-DE"/>
           </a:p>
@@ -2363,7 +2367,7 @@
           <a:p>
             <a:fld id="{763F7E3C-F070-438F-982D-66A47D421027}" type="datetimeFigureOut">
               <a:rPr lang="de-DE" smtClean="0"/>
-              <a:t>12.02.2020</a:t>
+              <a:t>13.02.2020</a:t>
             </a:fld>
             <a:endParaRPr lang="de-DE"/>
           </a:p>
@@ -2405,7 +2409,7 @@
           <a:p>
             <a:fld id="{CB9E609B-8018-417F-A0D4-47DD4FF48DA6}" type="slidenum">
               <a:rPr lang="de-DE" smtClean="0"/>
-              <a:t>‹Nr.›</a:t>
+              <a:t>‹#›</a:t>
             </a:fld>
             <a:endParaRPr lang="de-DE"/>
           </a:p>
@@ -2576,7 +2580,7 @@
           <a:p>
             <a:fld id="{763F7E3C-F070-438F-982D-66A47D421027}" type="datetimeFigureOut">
               <a:rPr lang="de-DE" smtClean="0"/>
-              <a:t>12.02.2020</a:t>
+              <a:t>13.02.2020</a:t>
             </a:fld>
             <a:endParaRPr lang="de-DE"/>
           </a:p>
@@ -2654,7 +2658,7 @@
           <a:p>
             <a:fld id="{CB9E609B-8018-417F-A0D4-47DD4FF48DA6}" type="slidenum">
               <a:rPr lang="de-DE" smtClean="0"/>
-              <a:t>‹Nr.›</a:t>
+              <a:t>‹#›</a:t>
             </a:fld>
             <a:endParaRPr lang="de-DE"/>
           </a:p>
@@ -3034,18 +3038,33 @@
         </p:nvSpPr>
         <p:spPr>
           <a:xfrm>
-            <a:off x="1524000" y="1552131"/>
-            <a:ext cx="9144000" cy="2387600"/>
+            <a:off x="234177" y="2845649"/>
+            <a:ext cx="11731082" cy="2387600"/>
           </a:xfrm>
         </p:spPr>
         <p:txBody>
-          <a:bodyPr/>
-          <a:lstStyle/>
-          <a:p>
-            <a:r>
-              <a:rPr lang="de-DE" dirty="0"/>
-              <a:t>3D</a:t>
-            </a:r>
+          <a:bodyPr>
+            <a:normAutofit/>
+          </a:bodyPr>
+          <a:lstStyle/>
+          <a:p>
+            <a:r>
+              <a:rPr lang="en-US" sz="4800" dirty="0"/>
+              <a:t>3D Reconstruction of small </a:t>
+            </a:r>
+            <a:r>
+              <a:rPr lang="en-US" sz="4800" dirty="0" smtClean="0"/>
+              <a:t>Solar System </a:t>
+            </a:r>
+            <a:r>
+              <a:rPr lang="en-US" sz="4800" dirty="0"/>
+              <a:t>bodies using rendered </a:t>
+            </a:r>
+            <a:r>
+              <a:rPr lang="en-US" sz="4800" dirty="0" smtClean="0"/>
+              <a:t>and compressed images</a:t>
+            </a:r>
+            <a:endParaRPr lang="de-DE" sz="4800" dirty="0"/>
           </a:p>
         </p:txBody>
       </p:sp>
@@ -3073,20 +3092,58 @@
         </p:spPr>
         <p:txBody>
           <a:bodyPr>
-            <a:normAutofit/>
+            <a:normAutofit fontScale="70000" lnSpcReduction="20000"/>
           </a:bodyPr>
           <a:lstStyle/>
           <a:p>
+            <a:pPr algn="l"/>
+            <a:r>
+              <a:rPr lang="de-DE" sz="2000" dirty="0" smtClean="0"/>
+              <a:t>Thesis </a:t>
+            </a:r>
             <a:r>
               <a:rPr lang="de-DE" sz="2000" dirty="0"/>
-              <a:t>Masterthesis Presentation</a:t>
-            </a:r>
-          </a:p>
-          <a:p>
+              <a:t>Presentation</a:t>
+            </a:r>
+          </a:p>
+          <a:p>
+            <a:pPr algn="l"/>
             <a:r>
               <a:rPr lang="de-DE" sz="2000" dirty="0"/>
-              <a:t>By Gabriel J. Schwarzkopf</a:t>
-            </a:r>
+              <a:t>By Gabriel J. </a:t>
+            </a:r>
+            <a:r>
+              <a:rPr lang="de-DE" sz="2000" dirty="0" smtClean="0"/>
+              <a:t>Schwarzkopf</a:t>
+            </a:r>
+          </a:p>
+          <a:p>
+            <a:pPr algn="l"/>
+            <a:r>
+              <a:rPr lang="de-DE" sz="2000" dirty="0" smtClean="0"/>
+              <a:t>Supervisor: Jaan </a:t>
+            </a:r>
+            <a:r>
+              <a:rPr lang="de-DE" sz="2000" dirty="0" err="1" smtClean="0"/>
+              <a:t>Praks</a:t>
+            </a:r>
+            <a:r>
+              <a:rPr lang="de-DE" sz="2000" dirty="0" smtClean="0"/>
+              <a:t>; </a:t>
+            </a:r>
+            <a:r>
+              <a:rPr lang="de-DE" sz="2000" dirty="0" err="1" smtClean="0"/>
+              <a:t>Advisor</a:t>
+            </a:r>
+            <a:r>
+              <a:rPr lang="de-DE" sz="2000" dirty="0" smtClean="0"/>
+              <a:t>: Andris </a:t>
+            </a:r>
+            <a:r>
+              <a:rPr lang="de-DE" sz="2000" dirty="0" err="1" smtClean="0"/>
+              <a:t>Slavinskis</a:t>
+            </a:r>
+            <a:endParaRPr lang="de-DE" sz="2000" dirty="0"/>
           </a:p>
         </p:txBody>
       </p:sp>
@@ -3094,6 +3151,446 @@
     <p:extLst>
       <p:ext uri="{BB962C8B-B14F-4D97-AF65-F5344CB8AC3E}">
         <p14:creationId xmlns:p14="http://schemas.microsoft.com/office/powerpoint/2010/main" val="3600566301"/>
+      </p:ext>
+    </p:extLst>
+  </p:cSld>
+  <p:clrMapOvr>
+    <a:masterClrMapping/>
+  </p:clrMapOvr>
+  <p:timing>
+    <p:tnLst>
+      <p:par>
+        <p:cTn id="1" dur="indefinite" restart="never" nodeType="tmRoot"/>
+      </p:par>
+    </p:tnLst>
+  </p:timing>
+</p:sld>
+</file>
+
+<file path=ppt/slides/slide10.xml><?xml version="1.0" encoding="utf-8"?>
+<p:sld xmlns:a="http://schemas.openxmlformats.org/drawingml/2006/main" xmlns:r="http://schemas.openxmlformats.org/officeDocument/2006/relationships" xmlns:p="http://schemas.openxmlformats.org/presentationml/2006/main">
+  <p:cSld>
+    <p:spTree>
+      <p:nvGrpSpPr>
+        <p:cNvPr id="1" name=""/>
+        <p:cNvGrpSpPr/>
+        <p:nvPr/>
+      </p:nvGrpSpPr>
+      <p:grpSpPr>
+        <a:xfrm>
+          <a:off x="0" y="0"/>
+          <a:ext cx="0" cy="0"/>
+          <a:chOff x="0" y="0"/>
+          <a:chExt cx="0" cy="0"/>
+        </a:xfrm>
+      </p:grpSpPr>
+      <p:pic>
+        <p:nvPicPr>
+          <p:cNvPr id="4" name="Grafik 3">
+            <a:extLst>
+              <a:ext uri="{FF2B5EF4-FFF2-40B4-BE49-F238E27FC236}">
+                <a16:creationId xmlns:a16="http://schemas.microsoft.com/office/drawing/2014/main" id="{9046EEE0-7BE1-4BBE-9175-4835F2B03910}"/>
+              </a:ext>
+            </a:extLst>
+          </p:cNvPr>
+          <p:cNvPicPr>
+            <a:picLocks noChangeAspect="1"/>
+          </p:cNvPicPr>
+          <p:nvPr/>
+        </p:nvPicPr>
+        <p:blipFill rotWithShape="1">
+          <a:blip r:embed="rId2">
+            <a:alphaModFix amt="30000"/>
+            <a:extLst>
+              <a:ext uri="{28A0092B-C50C-407E-A947-70E740481C1C}">
+                <a14:useLocalDpi xmlns:a14="http://schemas.microsoft.com/office/drawing/2010/main" val="0"/>
+              </a:ext>
+            </a:extLst>
+          </a:blip>
+          <a:srcRect l="30534" r="22575"/>
+          <a:stretch/>
+        </p:blipFill>
+        <p:spPr>
+          <a:xfrm rot="16200000">
+            <a:off x="2667000" y="-2667000"/>
+            <a:ext cx="6858000" cy="12191999"/>
+          </a:xfrm>
+          <a:prstGeom prst="rect">
+            <a:avLst/>
+          </a:prstGeom>
+        </p:spPr>
+      </p:pic>
+      <p:sp>
+        <p:nvSpPr>
+          <p:cNvPr id="2" name="Titel 1">
+            <a:extLst>
+              <a:ext uri="{FF2B5EF4-FFF2-40B4-BE49-F238E27FC236}">
+                <a16:creationId xmlns:a16="http://schemas.microsoft.com/office/drawing/2014/main" id="{30335016-F4C5-4F79-84AD-0E2E926CB1A3}"/>
+              </a:ext>
+            </a:extLst>
+          </p:cNvPr>
+          <p:cNvSpPr>
+            <a:spLocks noGrp="1"/>
+          </p:cNvSpPr>
+          <p:nvPr>
+            <p:ph type="title"/>
+          </p:nvPr>
+        </p:nvSpPr>
+        <p:spPr/>
+        <p:txBody>
+          <a:bodyPr/>
+          <a:lstStyle/>
+          <a:p>
+            <a:r>
+              <a:rPr lang="en-GB"/>
+              <a:t>Conclusion</a:t>
+            </a:r>
+          </a:p>
+        </p:txBody>
+      </p:sp>
+      <p:sp>
+        <p:nvSpPr>
+          <p:cNvPr id="3" name="Inhaltsplatzhalter 2">
+            <a:extLst>
+              <a:ext uri="{FF2B5EF4-FFF2-40B4-BE49-F238E27FC236}">
+                <a16:creationId xmlns:a16="http://schemas.microsoft.com/office/drawing/2014/main" id="{E7B267B8-8804-4D01-8DD3-014B8AF16ECD}"/>
+              </a:ext>
+            </a:extLst>
+          </p:cNvPr>
+          <p:cNvSpPr>
+            <a:spLocks noGrp="1"/>
+          </p:cNvSpPr>
+          <p:nvPr>
+            <p:ph idx="1"/>
+          </p:nvPr>
+        </p:nvSpPr>
+        <p:spPr/>
+        <p:txBody>
+          <a:bodyPr/>
+          <a:lstStyle/>
+          <a:p>
+            <a:r>
+              <a:rPr lang="en-GB" dirty="0"/>
+              <a:t>Compression reduced data substantially, JPEG2000 works </a:t>
+            </a:r>
+            <a:r>
+              <a:rPr lang="en-GB" dirty="0" smtClean="0"/>
+              <a:t>well</a:t>
+            </a:r>
+          </a:p>
+          <a:p>
+            <a:r>
+              <a:rPr lang="en-GB" dirty="0" err="1" smtClean="0"/>
+              <a:t>SfM</a:t>
+            </a:r>
+            <a:r>
+              <a:rPr lang="en-GB" dirty="0" smtClean="0"/>
+              <a:t> Both incremental necessary, global never</a:t>
+            </a:r>
+          </a:p>
+          <a:p>
+            <a:endParaRPr lang="en-GB" dirty="0"/>
+          </a:p>
+          <a:p>
+            <a:r>
+              <a:rPr lang="en-GB" dirty="0"/>
+              <a:t>First </a:t>
+            </a:r>
+            <a:r>
+              <a:rPr lang="en-GB" dirty="0" smtClean="0"/>
+              <a:t>step for </a:t>
+            </a:r>
+            <a:r>
+              <a:rPr lang="en-GB" dirty="0" err="1" smtClean="0"/>
+              <a:t>sispo</a:t>
+            </a:r>
+            <a:endParaRPr lang="en-GB" dirty="0"/>
+          </a:p>
+          <a:p>
+            <a:r>
+              <a:rPr lang="en-GB" dirty="0"/>
+              <a:t>Many things to do</a:t>
+            </a:r>
+          </a:p>
+          <a:p>
+            <a:endParaRPr lang="en-GB" dirty="0"/>
+          </a:p>
+        </p:txBody>
+      </p:sp>
+    </p:spTree>
+    <p:extLst>
+      <p:ext uri="{BB962C8B-B14F-4D97-AF65-F5344CB8AC3E}">
+        <p14:creationId xmlns:p14="http://schemas.microsoft.com/office/powerpoint/2010/main" val="3396096290"/>
+      </p:ext>
+    </p:extLst>
+  </p:cSld>
+  <p:clrMapOvr>
+    <a:masterClrMapping/>
+  </p:clrMapOvr>
+</p:sld>
+</file>
+
+<file path=ppt/slides/slide11.xml><?xml version="1.0" encoding="utf-8"?>
+<p:sld xmlns:a="http://schemas.openxmlformats.org/drawingml/2006/main" xmlns:r="http://schemas.openxmlformats.org/officeDocument/2006/relationships" xmlns:p="http://schemas.openxmlformats.org/presentationml/2006/main">
+  <p:cSld>
+    <p:spTree>
+      <p:nvGrpSpPr>
+        <p:cNvPr id="1" name=""/>
+        <p:cNvGrpSpPr/>
+        <p:nvPr/>
+      </p:nvGrpSpPr>
+      <p:grpSpPr>
+        <a:xfrm>
+          <a:off x="0" y="0"/>
+          <a:ext cx="0" cy="0"/>
+          <a:chOff x="0" y="0"/>
+          <a:chExt cx="0" cy="0"/>
+        </a:xfrm>
+      </p:grpSpPr>
+      <p:pic>
+        <p:nvPicPr>
+          <p:cNvPr id="6" name="Grafik 5">
+            <a:extLst>
+              <a:ext uri="{FF2B5EF4-FFF2-40B4-BE49-F238E27FC236}">
+                <a16:creationId xmlns:a16="http://schemas.microsoft.com/office/drawing/2014/main" id="{90ADB998-D45D-4EB8-B168-1ED0EA096B07}"/>
+              </a:ext>
+            </a:extLst>
+          </p:cNvPr>
+          <p:cNvPicPr>
+            <a:picLocks noChangeAspect="1"/>
+          </p:cNvPicPr>
+          <p:nvPr/>
+        </p:nvPicPr>
+        <p:blipFill rotWithShape="1">
+          <a:blip r:embed="rId2">
+            <a:extLst>
+              <a:ext uri="{28A0092B-C50C-407E-A947-70E740481C1C}">
+                <a14:useLocalDpi xmlns:a14="http://schemas.microsoft.com/office/drawing/2010/main" val="0"/>
+              </a:ext>
+            </a:extLst>
+          </a:blip>
+          <a:srcRect l="30534" r="22575"/>
+          <a:stretch/>
+        </p:blipFill>
+        <p:spPr>
+          <a:xfrm rot="16200000">
+            <a:off x="2667000" y="-2667000"/>
+            <a:ext cx="6858000" cy="12191999"/>
+          </a:xfrm>
+          <a:prstGeom prst="rect">
+            <a:avLst/>
+          </a:prstGeom>
+        </p:spPr>
+      </p:pic>
+      <p:sp>
+        <p:nvSpPr>
+          <p:cNvPr id="4" name="Titel 3">
+            <a:extLst>
+              <a:ext uri="{FF2B5EF4-FFF2-40B4-BE49-F238E27FC236}">
+                <a16:creationId xmlns:a16="http://schemas.microsoft.com/office/drawing/2014/main" id="{8576ECCA-FD84-45FC-8522-2C9E116540E1}"/>
+              </a:ext>
+            </a:extLst>
+          </p:cNvPr>
+          <p:cNvSpPr>
+            <a:spLocks noGrp="1"/>
+          </p:cNvSpPr>
+          <p:nvPr>
+            <p:ph type="ctrTitle"/>
+          </p:nvPr>
+        </p:nvSpPr>
+        <p:spPr>
+          <a:xfrm>
+            <a:off x="1524000" y="3792411"/>
+            <a:ext cx="9144000" cy="2387600"/>
+          </a:xfrm>
+        </p:spPr>
+        <p:txBody>
+          <a:bodyPr/>
+          <a:lstStyle/>
+          <a:p>
+            <a:r>
+              <a:rPr lang="de-DE" dirty="0" err="1"/>
+              <a:t>Thank</a:t>
+            </a:r>
+            <a:r>
+              <a:rPr lang="de-DE" dirty="0"/>
+              <a:t> you for your </a:t>
+            </a:r>
+            <a:r>
+              <a:rPr lang="de-DE" dirty="0" err="1"/>
+              <a:t>attention</a:t>
+            </a:r>
+            <a:r>
+              <a:rPr lang="de-DE" dirty="0"/>
+              <a:t>!</a:t>
+            </a:r>
+          </a:p>
+        </p:txBody>
+      </p:sp>
+    </p:spTree>
+    <p:extLst>
+      <p:ext uri="{BB962C8B-B14F-4D97-AF65-F5344CB8AC3E}">
+        <p14:creationId xmlns:p14="http://schemas.microsoft.com/office/powerpoint/2010/main" val="936038027"/>
+      </p:ext>
+    </p:extLst>
+  </p:cSld>
+  <p:clrMapOvr>
+    <a:masterClrMapping/>
+  </p:clrMapOvr>
+</p:sld>
+</file>
+
+<file path=ppt/slides/slide12.xml><?xml version="1.0" encoding="utf-8"?>
+<p:sld xmlns:a="http://schemas.openxmlformats.org/drawingml/2006/main" xmlns:r="http://schemas.openxmlformats.org/officeDocument/2006/relationships" xmlns:p="http://schemas.openxmlformats.org/presentationml/2006/main">
+  <p:cSld>
+    <p:spTree>
+      <p:nvGrpSpPr>
+        <p:cNvPr id="1" name=""/>
+        <p:cNvGrpSpPr/>
+        <p:nvPr/>
+      </p:nvGrpSpPr>
+      <p:grpSpPr>
+        <a:xfrm>
+          <a:off x="0" y="0"/>
+          <a:ext cx="0" cy="0"/>
+          <a:chOff x="0" y="0"/>
+          <a:chExt cx="0" cy="0"/>
+        </a:xfrm>
+      </p:grpSpPr>
+      <p:sp>
+        <p:nvSpPr>
+          <p:cNvPr id="2" name="Titel 1">
+            <a:extLst>
+              <a:ext uri="{FF2B5EF4-FFF2-40B4-BE49-F238E27FC236}">
+                <a16:creationId xmlns:a16="http://schemas.microsoft.com/office/drawing/2014/main" id="{E415FEDB-10C4-4548-8210-BDC1473B05A4}"/>
+              </a:ext>
+            </a:extLst>
+          </p:cNvPr>
+          <p:cNvSpPr>
+            <a:spLocks noGrp="1"/>
+          </p:cNvSpPr>
+          <p:nvPr>
+            <p:ph type="title"/>
+          </p:nvPr>
+        </p:nvSpPr>
+        <p:spPr/>
+        <p:txBody>
+          <a:bodyPr/>
+          <a:lstStyle/>
+          <a:p>
+            <a:endParaRPr lang="de-DE"/>
+          </a:p>
+        </p:txBody>
+      </p:sp>
+      <p:sp>
+        <p:nvSpPr>
+          <p:cNvPr id="3" name="Inhaltsplatzhalter 2">
+            <a:extLst>
+              <a:ext uri="{FF2B5EF4-FFF2-40B4-BE49-F238E27FC236}">
+                <a16:creationId xmlns:a16="http://schemas.microsoft.com/office/drawing/2014/main" id="{5E54993C-399B-4BEC-899A-A8D211C084E4}"/>
+              </a:ext>
+            </a:extLst>
+          </p:cNvPr>
+          <p:cNvSpPr>
+            <a:spLocks noGrp="1"/>
+          </p:cNvSpPr>
+          <p:nvPr>
+            <p:ph idx="1"/>
+          </p:nvPr>
+        </p:nvSpPr>
+        <p:spPr/>
+        <p:txBody>
+          <a:bodyPr/>
+          <a:lstStyle/>
+          <a:p>
+            <a:endParaRPr lang="de-DE" dirty="0"/>
+          </a:p>
+        </p:txBody>
+      </p:sp>
+    </p:spTree>
+    <p:extLst>
+      <p:ext uri="{BB962C8B-B14F-4D97-AF65-F5344CB8AC3E}">
+        <p14:creationId xmlns:p14="http://schemas.microsoft.com/office/powerpoint/2010/main" val="184944192"/>
+      </p:ext>
+    </p:extLst>
+  </p:cSld>
+  <p:clrMapOvr>
+    <a:masterClrMapping/>
+  </p:clrMapOvr>
+</p:sld>
+</file>
+
+<file path=ppt/slides/slide13.xml><?xml version="1.0" encoding="utf-8"?>
+<p:sld xmlns:a="http://schemas.openxmlformats.org/drawingml/2006/main" xmlns:r="http://schemas.openxmlformats.org/officeDocument/2006/relationships" xmlns:p="http://schemas.openxmlformats.org/presentationml/2006/main">
+  <p:cSld>
+    <p:spTree>
+      <p:nvGrpSpPr>
+        <p:cNvPr id="1" name=""/>
+        <p:cNvGrpSpPr/>
+        <p:nvPr/>
+      </p:nvGrpSpPr>
+      <p:grpSpPr>
+        <a:xfrm>
+          <a:off x="0" y="0"/>
+          <a:ext cx="0" cy="0"/>
+          <a:chOff x="0" y="0"/>
+          <a:chExt cx="0" cy="0"/>
+        </a:xfrm>
+      </p:grpSpPr>
+      <p:sp>
+        <p:nvSpPr>
+          <p:cNvPr id="2" name="Titel 1">
+            <a:extLst>
+              <a:ext uri="{FF2B5EF4-FFF2-40B4-BE49-F238E27FC236}">
+                <a16:creationId xmlns:a16="http://schemas.microsoft.com/office/drawing/2014/main" id="{857CE1A7-DBFF-49C2-829B-F57575180AFB}"/>
+              </a:ext>
+            </a:extLst>
+          </p:cNvPr>
+          <p:cNvSpPr>
+            <a:spLocks noGrp="1"/>
+          </p:cNvSpPr>
+          <p:nvPr>
+            <p:ph type="title"/>
+          </p:nvPr>
+        </p:nvSpPr>
+        <p:spPr/>
+        <p:txBody>
+          <a:bodyPr/>
+          <a:lstStyle/>
+          <a:p>
+            <a:endParaRPr lang="de-DE"/>
+          </a:p>
+        </p:txBody>
+      </p:sp>
+      <p:sp>
+        <p:nvSpPr>
+          <p:cNvPr id="3" name="Inhaltsplatzhalter 2">
+            <a:extLst>
+              <a:ext uri="{FF2B5EF4-FFF2-40B4-BE49-F238E27FC236}">
+                <a16:creationId xmlns:a16="http://schemas.microsoft.com/office/drawing/2014/main" id="{1491A94B-662B-495C-A782-A033DADB4D95}"/>
+              </a:ext>
+            </a:extLst>
+          </p:cNvPr>
+          <p:cNvSpPr>
+            <a:spLocks noGrp="1"/>
+          </p:cNvSpPr>
+          <p:nvPr>
+            <p:ph idx="1"/>
+          </p:nvPr>
+        </p:nvSpPr>
+        <p:spPr/>
+        <p:txBody>
+          <a:bodyPr/>
+          <a:lstStyle/>
+          <a:p>
+            <a:endParaRPr lang="de-DE"/>
+          </a:p>
+        </p:txBody>
+      </p:sp>
+    </p:spTree>
+    <p:extLst>
+      <p:ext uri="{BB962C8B-B14F-4D97-AF65-F5344CB8AC3E}">
+        <p14:creationId xmlns:p14="http://schemas.microsoft.com/office/powerpoint/2010/main" val="174998524"/>
       </p:ext>
     </p:extLst>
   </p:cSld>
@@ -3214,25 +3711,32 @@
           <a:lstStyle/>
           <a:p>
             <a:r>
-              <a:rPr lang="en-GB"/>
+              <a:rPr lang="en-GB" dirty="0" smtClean="0"/>
+              <a:t>Motivation</a:t>
+            </a:r>
+          </a:p>
+          <a:p>
+            <a:r>
+              <a:rPr lang="en-GB" dirty="0" smtClean="0"/>
               <a:t>Theory</a:t>
             </a:r>
-          </a:p>
-          <a:p>
-            <a:r>
-              <a:rPr lang="en-GB"/>
+            <a:endParaRPr lang="en-GB" dirty="0"/>
+          </a:p>
+          <a:p>
+            <a:r>
+              <a:rPr lang="en-GB" dirty="0"/>
               <a:t>Implementation</a:t>
             </a:r>
           </a:p>
           <a:p>
             <a:r>
-              <a:rPr lang="en-GB"/>
+              <a:rPr lang="en-GB" dirty="0"/>
               <a:t>Results</a:t>
             </a:r>
           </a:p>
           <a:p>
             <a:r>
-              <a:rPr lang="en-GB"/>
+              <a:rPr lang="en-GB" dirty="0"/>
               <a:t>Conclusion</a:t>
             </a:r>
           </a:p>
@@ -3248,10 +3752,214 @@
   <p:clrMapOvr>
     <a:masterClrMapping/>
   </p:clrMapOvr>
+  <p:timing>
+    <p:tnLst>
+      <p:par>
+        <p:cTn id="1" dur="indefinite" restart="never" nodeType="tmRoot"/>
+      </p:par>
+    </p:tnLst>
+  </p:timing>
 </p:sld>
 </file>
 
 <file path=ppt/slides/slide3.xml><?xml version="1.0" encoding="utf-8"?>
+<p:sld xmlns:a="http://schemas.openxmlformats.org/drawingml/2006/main" xmlns:r="http://schemas.openxmlformats.org/officeDocument/2006/relationships" xmlns:p="http://schemas.openxmlformats.org/presentationml/2006/main">
+  <p:cSld>
+    <p:bg>
+      <p:bgPr>
+        <a:solidFill>
+          <a:schemeClr val="bg1"/>
+        </a:solidFill>
+        <a:effectLst/>
+      </p:bgPr>
+    </p:bg>
+    <p:spTree>
+      <p:nvGrpSpPr>
+        <p:cNvPr id="1" name=""/>
+        <p:cNvGrpSpPr/>
+        <p:nvPr/>
+      </p:nvGrpSpPr>
+      <p:grpSpPr>
+        <a:xfrm>
+          <a:off x="0" y="0"/>
+          <a:ext cx="0" cy="0"/>
+          <a:chOff x="0" y="0"/>
+          <a:chExt cx="0" cy="0"/>
+        </a:xfrm>
+      </p:grpSpPr>
+      <p:pic>
+        <p:nvPicPr>
+          <p:cNvPr id="6" name="Grafik 5">
+            <a:extLst>
+              <a:ext uri="{FF2B5EF4-FFF2-40B4-BE49-F238E27FC236}">
+                <a16:creationId xmlns:a16="http://schemas.microsoft.com/office/drawing/2014/main" id="{70D5E112-C414-47FE-9857-4FF3ECBCFDAA}"/>
+              </a:ext>
+            </a:extLst>
+          </p:cNvPr>
+          <p:cNvPicPr>
+            <a:picLocks noChangeAspect="1"/>
+          </p:cNvPicPr>
+          <p:nvPr/>
+        </p:nvPicPr>
+        <p:blipFill rotWithShape="1">
+          <a:blip r:embed="rId2">
+            <a:alphaModFix amt="30000"/>
+            <a:extLst>
+              <a:ext uri="{28A0092B-C50C-407E-A947-70E740481C1C}">
+                <a14:useLocalDpi xmlns:a14="http://schemas.microsoft.com/office/drawing/2010/main" val="0"/>
+              </a:ext>
+            </a:extLst>
+          </a:blip>
+          <a:srcRect l="30534" r="22575"/>
+          <a:stretch/>
+        </p:blipFill>
+        <p:spPr>
+          <a:xfrm rot="16200000">
+            <a:off x="2667000" y="-2667000"/>
+            <a:ext cx="6858000" cy="12191999"/>
+          </a:xfrm>
+          <a:prstGeom prst="rect">
+            <a:avLst/>
+          </a:prstGeom>
+        </p:spPr>
+      </p:pic>
+      <p:sp>
+        <p:nvSpPr>
+          <p:cNvPr id="2" name="Titel 1">
+            <a:extLst>
+              <a:ext uri="{FF2B5EF4-FFF2-40B4-BE49-F238E27FC236}">
+                <a16:creationId xmlns:a16="http://schemas.microsoft.com/office/drawing/2014/main" id="{CAC49582-938F-40A9-BE38-62426BD43DF1}"/>
+              </a:ext>
+            </a:extLst>
+          </p:cNvPr>
+          <p:cNvSpPr>
+            <a:spLocks noGrp="1"/>
+          </p:cNvSpPr>
+          <p:nvPr>
+            <p:ph type="title"/>
+          </p:nvPr>
+        </p:nvSpPr>
+        <p:spPr/>
+        <p:txBody>
+          <a:bodyPr/>
+          <a:lstStyle/>
+          <a:p>
+            <a:r>
+              <a:rPr lang="en-GB" dirty="0" smtClean="0"/>
+              <a:t>Motivation</a:t>
+            </a:r>
+            <a:endParaRPr lang="en-GB" dirty="0"/>
+          </a:p>
+        </p:txBody>
+      </p:sp>
+      <p:sp>
+        <p:nvSpPr>
+          <p:cNvPr id="3" name="Inhaltsplatzhalter 2">
+            <a:extLst>
+              <a:ext uri="{FF2B5EF4-FFF2-40B4-BE49-F238E27FC236}">
+                <a16:creationId xmlns:a16="http://schemas.microsoft.com/office/drawing/2014/main" id="{4EF1F290-019A-40A3-A5B9-1D3A52347D19}"/>
+              </a:ext>
+            </a:extLst>
+          </p:cNvPr>
+          <p:cNvSpPr>
+            <a:spLocks noGrp="1"/>
+          </p:cNvSpPr>
+          <p:nvPr>
+            <p:ph idx="1"/>
+          </p:nvPr>
+        </p:nvSpPr>
+        <p:spPr/>
+        <p:txBody>
+          <a:bodyPr>
+            <a:normAutofit lnSpcReduction="10000"/>
+          </a:bodyPr>
+          <a:lstStyle/>
+          <a:p>
+            <a:r>
+              <a:rPr lang="en-GB" dirty="0" smtClean="0"/>
+              <a:t>Solar System formation</a:t>
+            </a:r>
+          </a:p>
+          <a:p>
+            <a:r>
+              <a:rPr lang="en-GB" dirty="0" smtClean="0"/>
+              <a:t>Limited Information from remote observations</a:t>
+            </a:r>
+          </a:p>
+          <a:p>
+            <a:r>
+              <a:rPr lang="en-GB" dirty="0" smtClean="0"/>
+              <a:t>In-situ more detailed information</a:t>
+            </a:r>
+          </a:p>
+          <a:p>
+            <a:r>
+              <a:rPr lang="en-GB" dirty="0" smtClean="0"/>
+              <a:t>Small sat flyby as compromise between number of targets and in-situ</a:t>
+            </a:r>
+          </a:p>
+          <a:p>
+            <a:r>
+              <a:rPr lang="en-GB" dirty="0" smtClean="0"/>
+              <a:t>Confirmed missions (Comet interceptor and Hera) and concepts (</a:t>
+            </a:r>
+            <a:r>
+              <a:rPr lang="en-GB" dirty="0" err="1" smtClean="0"/>
+              <a:t>CASTAway</a:t>
+            </a:r>
+            <a:r>
+              <a:rPr lang="en-GB" dirty="0" smtClean="0"/>
+              <a:t> and MANTIS)</a:t>
+            </a:r>
+          </a:p>
+          <a:p>
+            <a:r>
+              <a:rPr lang="en-GB" dirty="0" smtClean="0"/>
+              <a:t>Synthetic image creation because missing real images</a:t>
+            </a:r>
+          </a:p>
+          <a:p>
+            <a:r>
+              <a:rPr lang="en-GB" dirty="0" err="1" smtClean="0"/>
+              <a:t>Hapke</a:t>
+            </a:r>
+            <a:r>
+              <a:rPr lang="en-GB" dirty="0" smtClean="0"/>
+              <a:t> model is empirical and has problems</a:t>
+            </a:r>
+          </a:p>
+          <a:p>
+            <a:r>
+              <a:rPr lang="en-GB" dirty="0" smtClean="0"/>
+              <a:t>SISPO provides solution</a:t>
+            </a:r>
+          </a:p>
+          <a:p>
+            <a:endParaRPr lang="en-GB" dirty="0"/>
+          </a:p>
+        </p:txBody>
+      </p:sp>
+    </p:spTree>
+    <p:extLst>
+      <p:ext uri="{BB962C8B-B14F-4D97-AF65-F5344CB8AC3E}">
+        <p14:creationId xmlns:p14="http://schemas.microsoft.com/office/powerpoint/2010/main" val="1564597829"/>
+      </p:ext>
+    </p:extLst>
+  </p:cSld>
+  <p:clrMapOvr>
+    <a:masterClrMapping/>
+  </p:clrMapOvr>
+  <p:timing>
+    <p:tnLst>
+      <p:par>
+        <p:cTn id="1" dur="indefinite" restart="never" nodeType="tmRoot"/>
+      </p:par>
+    </p:tnLst>
+  </p:timing>
+</p:sld>
+</file>
+
+<file path=ppt/slides/slide4.xml><?xml version="1.0" encoding="utf-8"?>
 <p:sld xmlns:a="http://schemas.openxmlformats.org/drawingml/2006/main" xmlns:r="http://schemas.openxmlformats.org/officeDocument/2006/relationships" xmlns:p="http://schemas.openxmlformats.org/presentationml/2006/main">
   <p:cSld>
     <p:spTree>
@@ -3326,9 +4034,10 @@
           <a:lstStyle/>
           <a:p>
             <a:r>
-              <a:rPr lang="en-GB"/>
-              <a:t>Theory</a:t>
-            </a:r>
+              <a:rPr lang="en-GB" dirty="0" smtClean="0"/>
+              <a:t>Theory - Rendering</a:t>
+            </a:r>
+            <a:endParaRPr lang="en-GB" dirty="0"/>
           </a:p>
         </p:txBody>
       </p:sp>
@@ -3354,30 +4063,10 @@
           <a:lstStyle/>
           <a:p>
             <a:r>
-              <a:rPr lang="en-GB" dirty="0"/>
-              <a:t>Computer Vision</a:t>
-            </a:r>
-          </a:p>
-          <a:p>
-            <a:pPr lvl="1"/>
-            <a:r>
-              <a:rPr lang="en-GB" dirty="0"/>
-              <a:t>Pinhole camera</a:t>
-            </a:r>
-          </a:p>
-          <a:p>
-            <a:pPr lvl="1"/>
-            <a:r>
-              <a:rPr lang="en-GB" dirty="0" err="1"/>
-              <a:t>SfM</a:t>
+              <a:rPr lang="en-GB" dirty="0" smtClean="0"/>
+              <a:t>Rendering</a:t>
             </a:r>
             <a:endParaRPr lang="en-GB" dirty="0"/>
-          </a:p>
-          <a:p>
-            <a:r>
-              <a:rPr lang="en-GB" dirty="0"/>
-              <a:t>Rendering</a:t>
-            </a:r>
           </a:p>
           <a:p>
             <a:pPr lvl="1"/>
@@ -3415,10 +4104,165 @@
   <p:clrMapOvr>
     <a:masterClrMapping/>
   </p:clrMapOvr>
+  <p:timing>
+    <p:tnLst>
+      <p:par>
+        <p:cTn id="1" dur="indefinite" restart="never" nodeType="tmRoot"/>
+      </p:par>
+    </p:tnLst>
+  </p:timing>
 </p:sld>
 </file>
 
-<file path=ppt/slides/slide4.xml><?xml version="1.0" encoding="utf-8"?>
+<file path=ppt/slides/slide5.xml><?xml version="1.0" encoding="utf-8"?>
+<p:sld xmlns:a="http://schemas.openxmlformats.org/drawingml/2006/main" xmlns:r="http://schemas.openxmlformats.org/officeDocument/2006/relationships" xmlns:p="http://schemas.openxmlformats.org/presentationml/2006/main">
+  <p:cSld>
+    <p:spTree>
+      <p:nvGrpSpPr>
+        <p:cNvPr id="1" name=""/>
+        <p:cNvGrpSpPr/>
+        <p:nvPr/>
+      </p:nvGrpSpPr>
+      <p:grpSpPr>
+        <a:xfrm>
+          <a:off x="0" y="0"/>
+          <a:ext cx="0" cy="0"/>
+          <a:chOff x="0" y="0"/>
+          <a:chExt cx="0" cy="0"/>
+        </a:xfrm>
+      </p:grpSpPr>
+      <p:pic>
+        <p:nvPicPr>
+          <p:cNvPr id="4" name="Grafik 3">
+            <a:extLst>
+              <a:ext uri="{FF2B5EF4-FFF2-40B4-BE49-F238E27FC236}">
+                <a16:creationId xmlns:a16="http://schemas.microsoft.com/office/drawing/2014/main" id="{2FF5211C-2EF3-4D65-ABD2-3A4E762D52DE}"/>
+              </a:ext>
+            </a:extLst>
+          </p:cNvPr>
+          <p:cNvPicPr>
+            <a:picLocks noChangeAspect="1"/>
+          </p:cNvPicPr>
+          <p:nvPr/>
+        </p:nvPicPr>
+        <p:blipFill rotWithShape="1">
+          <a:blip r:embed="rId2">
+            <a:alphaModFix amt="30000"/>
+            <a:extLst>
+              <a:ext uri="{28A0092B-C50C-407E-A947-70E740481C1C}">
+                <a14:useLocalDpi xmlns:a14="http://schemas.microsoft.com/office/drawing/2010/main" val="0"/>
+              </a:ext>
+            </a:extLst>
+          </a:blip>
+          <a:srcRect l="30534" r="22575"/>
+          <a:stretch/>
+        </p:blipFill>
+        <p:spPr>
+          <a:xfrm rot="16200000">
+            <a:off x="2667000" y="-2667000"/>
+            <a:ext cx="6858000" cy="12191999"/>
+          </a:xfrm>
+          <a:prstGeom prst="rect">
+            <a:avLst/>
+          </a:prstGeom>
+        </p:spPr>
+      </p:pic>
+      <p:sp>
+        <p:nvSpPr>
+          <p:cNvPr id="2" name="Titel 1">
+            <a:extLst>
+              <a:ext uri="{FF2B5EF4-FFF2-40B4-BE49-F238E27FC236}">
+                <a16:creationId xmlns:a16="http://schemas.microsoft.com/office/drawing/2014/main" id="{97923B16-66E9-41C3-ADED-FC68904FBCF2}"/>
+              </a:ext>
+            </a:extLst>
+          </p:cNvPr>
+          <p:cNvSpPr>
+            <a:spLocks noGrp="1"/>
+          </p:cNvSpPr>
+          <p:nvPr>
+            <p:ph type="title"/>
+          </p:nvPr>
+        </p:nvSpPr>
+        <p:spPr/>
+        <p:txBody>
+          <a:bodyPr/>
+          <a:lstStyle/>
+          <a:p>
+            <a:r>
+              <a:rPr lang="en-GB" dirty="0" smtClean="0"/>
+              <a:t>Theory – Computer Vision</a:t>
+            </a:r>
+            <a:endParaRPr lang="en-GB" dirty="0"/>
+          </a:p>
+        </p:txBody>
+      </p:sp>
+      <p:sp>
+        <p:nvSpPr>
+          <p:cNvPr id="3" name="Inhaltsplatzhalter 2">
+            <a:extLst>
+              <a:ext uri="{FF2B5EF4-FFF2-40B4-BE49-F238E27FC236}">
+                <a16:creationId xmlns:a16="http://schemas.microsoft.com/office/drawing/2014/main" id="{DEA565A4-0F0A-47C2-AF20-606903114479}"/>
+              </a:ext>
+            </a:extLst>
+          </p:cNvPr>
+          <p:cNvSpPr>
+            <a:spLocks noGrp="1"/>
+          </p:cNvSpPr>
+          <p:nvPr>
+            <p:ph idx="1"/>
+          </p:nvPr>
+        </p:nvSpPr>
+        <p:spPr/>
+        <p:txBody>
+          <a:bodyPr/>
+          <a:lstStyle/>
+          <a:p>
+            <a:r>
+              <a:rPr lang="en-GB" dirty="0"/>
+              <a:t>Computer Vision</a:t>
+            </a:r>
+          </a:p>
+          <a:p>
+            <a:pPr lvl="1"/>
+            <a:r>
+              <a:rPr lang="en-GB" dirty="0"/>
+              <a:t>Pinhole camera</a:t>
+            </a:r>
+          </a:p>
+          <a:p>
+            <a:pPr lvl="1"/>
+            <a:r>
+              <a:rPr lang="en-GB" dirty="0" err="1"/>
+              <a:t>SfM</a:t>
+            </a:r>
+            <a:endParaRPr lang="en-GB" dirty="0"/>
+          </a:p>
+          <a:p>
+            <a:endParaRPr lang="en-GB" dirty="0"/>
+          </a:p>
+        </p:txBody>
+      </p:sp>
+    </p:spTree>
+    <p:extLst>
+      <p:ext uri="{BB962C8B-B14F-4D97-AF65-F5344CB8AC3E}">
+        <p14:creationId xmlns:p14="http://schemas.microsoft.com/office/powerpoint/2010/main" val="1863833713"/>
+      </p:ext>
+    </p:extLst>
+  </p:cSld>
+  <p:clrMapOvr>
+    <a:masterClrMapping/>
+  </p:clrMapOvr>
+  <p:timing>
+    <p:tnLst>
+      <p:par>
+        <p:cTn id="1" dur="indefinite" restart="never" nodeType="tmRoot"/>
+      </p:par>
+    </p:tnLst>
+  </p:timing>
+</p:sld>
+</file>
+
+<file path=ppt/slides/slide6.xml><?xml version="1.0" encoding="utf-8"?>
 <p:sld xmlns:a="http://schemas.openxmlformats.org/drawingml/2006/main" xmlns:r="http://schemas.openxmlformats.org/officeDocument/2006/relationships" xmlns:p="http://schemas.openxmlformats.org/presentationml/2006/main">
   <p:cSld>
     <p:spTree>
@@ -3533,64 +4377,334 @@
             </a:r>
           </a:p>
           <a:p>
-            <a:r>
-              <a:rPr lang="en-GB" dirty="0"/>
-              <a:t>Compression</a:t>
-            </a:r>
-          </a:p>
-          <a:p>
             <a:pPr lvl="1"/>
-            <a:r>
-              <a:rPr lang="en-GB" dirty="0"/>
-              <a:t>PNG and JP2000</a:t>
-            </a:r>
-          </a:p>
-          <a:p>
-            <a:r>
-              <a:rPr lang="en-GB" dirty="0" err="1"/>
-              <a:t>OpenMVG</a:t>
-            </a:r>
-            <a:r>
-              <a:rPr lang="en-GB" dirty="0"/>
-              <a:t>/</a:t>
-            </a:r>
-            <a:r>
-              <a:rPr lang="en-GB" dirty="0" err="1"/>
-              <a:t>OpenMVS</a:t>
-            </a:r>
             <a:endParaRPr lang="en-GB" dirty="0"/>
-          </a:p>
-          <a:p>
-            <a:pPr lvl="1"/>
-            <a:r>
-              <a:rPr lang="en-GB" dirty="0"/>
-              <a:t>Complete </a:t>
-            </a:r>
-            <a:r>
-              <a:rPr lang="en-GB" dirty="0" err="1"/>
-              <a:t>SfM</a:t>
-            </a:r>
-            <a:r>
-              <a:rPr lang="en-GB" dirty="0"/>
-              <a:t> pipeline from images to textured model</a:t>
-            </a:r>
           </a:p>
         </p:txBody>
       </p:sp>
     </p:spTree>
     <p:extLst>
       <p:ext uri="{BB962C8B-B14F-4D97-AF65-F5344CB8AC3E}">
-        <p14:creationId xmlns:p14="http://schemas.microsoft.com/office/powerpoint/2010/main" val="1909130916"/>
+        <p14:creationId xmlns:p14="http://schemas.microsoft.com/office/powerpoint/2010/main" val="3105337303"/>
       </p:ext>
     </p:extLst>
   </p:cSld>
   <p:clrMapOvr>
     <a:masterClrMapping/>
   </p:clrMapOvr>
+  <p:timing>
+    <p:tnLst>
+      <p:par>
+        <p:cTn id="1" dur="indefinite" restart="never" nodeType="tmRoot"/>
+      </p:par>
+    </p:tnLst>
+  </p:timing>
 </p:sld>
 </file>
 
-<file path=ppt/slides/slide5.xml><?xml version="1.0" encoding="utf-8"?>
+<file path=ppt/slides/slide7.xml><?xml version="1.0" encoding="utf-8"?>
+<p:sld xmlns:a="http://schemas.openxmlformats.org/drawingml/2006/main" xmlns:r="http://schemas.openxmlformats.org/officeDocument/2006/relationships" xmlns:p="http://schemas.openxmlformats.org/presentationml/2006/main">
+  <p:cSld>
+    <p:spTree>
+      <p:nvGrpSpPr>
+        <p:cNvPr id="1" name=""/>
+        <p:cNvGrpSpPr/>
+        <p:nvPr/>
+      </p:nvGrpSpPr>
+      <p:grpSpPr>
+        <a:xfrm>
+          <a:off x="0" y="0"/>
+          <a:ext cx="0" cy="0"/>
+          <a:chOff x="0" y="0"/>
+          <a:chExt cx="0" cy="0"/>
+        </a:xfrm>
+      </p:grpSpPr>
+      <p:pic>
+        <p:nvPicPr>
+          <p:cNvPr id="4" name="Grafik 3">
+            <a:extLst>
+              <a:ext uri="{FF2B5EF4-FFF2-40B4-BE49-F238E27FC236}">
+                <a16:creationId xmlns:a16="http://schemas.microsoft.com/office/drawing/2014/main" id="{869766C7-9411-4628-9369-0945D293525E}"/>
+              </a:ext>
+            </a:extLst>
+          </p:cNvPr>
+          <p:cNvPicPr>
+            <a:picLocks noChangeAspect="1"/>
+          </p:cNvPicPr>
+          <p:nvPr/>
+        </p:nvPicPr>
+        <p:blipFill rotWithShape="1">
+          <a:blip r:embed="rId2">
+            <a:alphaModFix amt="30000"/>
+            <a:extLst>
+              <a:ext uri="{28A0092B-C50C-407E-A947-70E740481C1C}">
+                <a14:useLocalDpi xmlns:a14="http://schemas.microsoft.com/office/drawing/2010/main" val="0"/>
+              </a:ext>
+            </a:extLst>
+          </a:blip>
+          <a:srcRect l="30534" r="22575"/>
+          <a:stretch/>
+        </p:blipFill>
+        <p:spPr>
+          <a:xfrm rot="16200000">
+            <a:off x="2667000" y="-2667000"/>
+            <a:ext cx="6858000" cy="12191999"/>
+          </a:xfrm>
+          <a:prstGeom prst="rect">
+            <a:avLst/>
+          </a:prstGeom>
+        </p:spPr>
+      </p:pic>
+      <p:sp>
+        <p:nvSpPr>
+          <p:cNvPr id="2" name="Titel 1">
+            <a:extLst>
+              <a:ext uri="{FF2B5EF4-FFF2-40B4-BE49-F238E27FC236}">
+                <a16:creationId xmlns:a16="http://schemas.microsoft.com/office/drawing/2014/main" id="{3E375A3F-AD0F-40A5-A3C0-00F6E011AE49}"/>
+              </a:ext>
+            </a:extLst>
+          </p:cNvPr>
+          <p:cNvSpPr>
+            <a:spLocks noGrp="1"/>
+          </p:cNvSpPr>
+          <p:nvPr>
+            <p:ph type="title"/>
+          </p:nvPr>
+        </p:nvSpPr>
+        <p:spPr/>
+        <p:txBody>
+          <a:bodyPr/>
+          <a:lstStyle/>
+          <a:p>
+            <a:r>
+              <a:rPr lang="en-GB"/>
+              <a:t>Implementation</a:t>
+            </a:r>
+          </a:p>
+        </p:txBody>
+      </p:sp>
+      <p:sp>
+        <p:nvSpPr>
+          <p:cNvPr id="3" name="Inhaltsplatzhalter 2">
+            <a:extLst>
+              <a:ext uri="{FF2B5EF4-FFF2-40B4-BE49-F238E27FC236}">
+                <a16:creationId xmlns:a16="http://schemas.microsoft.com/office/drawing/2014/main" id="{C6946B8C-67F6-4731-8D12-375DD79844A4}"/>
+              </a:ext>
+            </a:extLst>
+          </p:cNvPr>
+          <p:cNvSpPr>
+            <a:spLocks noGrp="1"/>
+          </p:cNvSpPr>
+          <p:nvPr>
+            <p:ph idx="1"/>
+          </p:nvPr>
+        </p:nvSpPr>
+        <p:spPr/>
+        <p:txBody>
+          <a:bodyPr/>
+          <a:lstStyle/>
+          <a:p>
+            <a:r>
+              <a:rPr lang="en-GB" dirty="0"/>
+              <a:t>Compression</a:t>
+            </a:r>
+          </a:p>
+          <a:p>
+            <a:pPr lvl="1"/>
+            <a:r>
+              <a:rPr lang="en-GB" dirty="0"/>
+              <a:t>PNG and JP2000</a:t>
+            </a:r>
+          </a:p>
+          <a:p>
+            <a:pPr lvl="1"/>
+            <a:endParaRPr lang="en-GB" dirty="0"/>
+          </a:p>
+        </p:txBody>
+      </p:sp>
+    </p:spTree>
+    <p:extLst>
+      <p:ext uri="{BB962C8B-B14F-4D97-AF65-F5344CB8AC3E}">
+        <p14:creationId xmlns:p14="http://schemas.microsoft.com/office/powerpoint/2010/main" val="3749151332"/>
+      </p:ext>
+    </p:extLst>
+  </p:cSld>
+  <p:clrMapOvr>
+    <a:masterClrMapping/>
+  </p:clrMapOvr>
+  <p:timing>
+    <p:tnLst>
+      <p:par>
+        <p:cTn id="1" dur="indefinite" restart="never" nodeType="tmRoot"/>
+      </p:par>
+    </p:tnLst>
+  </p:timing>
+</p:sld>
+</file>
+
+<file path=ppt/slides/slide8.xml><?xml version="1.0" encoding="utf-8"?>
+<p:sld xmlns:a="http://schemas.openxmlformats.org/drawingml/2006/main" xmlns:r="http://schemas.openxmlformats.org/officeDocument/2006/relationships" xmlns:p="http://schemas.openxmlformats.org/presentationml/2006/main">
+  <p:cSld>
+    <p:spTree>
+      <p:nvGrpSpPr>
+        <p:cNvPr id="1" name=""/>
+        <p:cNvGrpSpPr/>
+        <p:nvPr/>
+      </p:nvGrpSpPr>
+      <p:grpSpPr>
+        <a:xfrm>
+          <a:off x="0" y="0"/>
+          <a:ext cx="0" cy="0"/>
+          <a:chOff x="0" y="0"/>
+          <a:chExt cx="0" cy="0"/>
+        </a:xfrm>
+      </p:grpSpPr>
+      <p:pic>
+        <p:nvPicPr>
+          <p:cNvPr id="4" name="Grafik 3">
+            <a:extLst>
+              <a:ext uri="{FF2B5EF4-FFF2-40B4-BE49-F238E27FC236}">
+                <a16:creationId xmlns:a16="http://schemas.microsoft.com/office/drawing/2014/main" id="{869766C7-9411-4628-9369-0945D293525E}"/>
+              </a:ext>
+            </a:extLst>
+          </p:cNvPr>
+          <p:cNvPicPr>
+            <a:picLocks noChangeAspect="1"/>
+          </p:cNvPicPr>
+          <p:nvPr/>
+        </p:nvPicPr>
+        <p:blipFill rotWithShape="1">
+          <a:blip r:embed="rId2">
+            <a:alphaModFix amt="30000"/>
+            <a:extLst>
+              <a:ext uri="{28A0092B-C50C-407E-A947-70E740481C1C}">
+                <a14:useLocalDpi xmlns:a14="http://schemas.microsoft.com/office/drawing/2010/main" val="0"/>
+              </a:ext>
+            </a:extLst>
+          </a:blip>
+          <a:srcRect l="30534" r="22575"/>
+          <a:stretch/>
+        </p:blipFill>
+        <p:spPr>
+          <a:xfrm rot="16200000">
+            <a:off x="2667000" y="-2667000"/>
+            <a:ext cx="6858000" cy="12191999"/>
+          </a:xfrm>
+          <a:prstGeom prst="rect">
+            <a:avLst/>
+          </a:prstGeom>
+        </p:spPr>
+      </p:pic>
+      <p:sp>
+        <p:nvSpPr>
+          <p:cNvPr id="2" name="Titel 1">
+            <a:extLst>
+              <a:ext uri="{FF2B5EF4-FFF2-40B4-BE49-F238E27FC236}">
+                <a16:creationId xmlns:a16="http://schemas.microsoft.com/office/drawing/2014/main" id="{3E375A3F-AD0F-40A5-A3C0-00F6E011AE49}"/>
+              </a:ext>
+            </a:extLst>
+          </p:cNvPr>
+          <p:cNvSpPr>
+            <a:spLocks noGrp="1"/>
+          </p:cNvSpPr>
+          <p:nvPr>
+            <p:ph type="title"/>
+          </p:nvPr>
+        </p:nvSpPr>
+        <p:spPr/>
+        <p:txBody>
+          <a:bodyPr/>
+          <a:lstStyle/>
+          <a:p>
+            <a:r>
+              <a:rPr lang="en-GB"/>
+              <a:t>Implementation</a:t>
+            </a:r>
+          </a:p>
+        </p:txBody>
+      </p:sp>
+      <p:sp>
+        <p:nvSpPr>
+          <p:cNvPr id="3" name="Inhaltsplatzhalter 2">
+            <a:extLst>
+              <a:ext uri="{FF2B5EF4-FFF2-40B4-BE49-F238E27FC236}">
+                <a16:creationId xmlns:a16="http://schemas.microsoft.com/office/drawing/2014/main" id="{C6946B8C-67F6-4731-8D12-375DD79844A4}"/>
+              </a:ext>
+            </a:extLst>
+          </p:cNvPr>
+          <p:cNvSpPr>
+            <a:spLocks noGrp="1"/>
+          </p:cNvSpPr>
+          <p:nvPr>
+            <p:ph idx="1"/>
+          </p:nvPr>
+        </p:nvSpPr>
+        <p:spPr/>
+        <p:txBody>
+          <a:bodyPr/>
+          <a:lstStyle/>
+          <a:p>
+            <a:r>
+              <a:rPr lang="en-GB" dirty="0" err="1"/>
+              <a:t>SfM</a:t>
+            </a:r>
+            <a:endParaRPr lang="en-GB" dirty="0"/>
+          </a:p>
+          <a:p>
+            <a:pPr lvl="1"/>
+            <a:r>
+              <a:rPr lang="en-GB" dirty="0"/>
+              <a:t>Complete </a:t>
+            </a:r>
+            <a:r>
+              <a:rPr lang="en-GB" dirty="0" err="1"/>
+              <a:t>SfM</a:t>
+            </a:r>
+            <a:r>
+              <a:rPr lang="en-GB" dirty="0"/>
+              <a:t> pipeline from images to textured model with </a:t>
+            </a:r>
+            <a:r>
+              <a:rPr lang="en-GB" dirty="0" err="1"/>
+              <a:t>OpenMVG</a:t>
+            </a:r>
+            <a:r>
+              <a:rPr lang="en-GB" dirty="0"/>
+              <a:t>/</a:t>
+            </a:r>
+            <a:r>
+              <a:rPr lang="en-GB" dirty="0" err="1"/>
+              <a:t>OpenMVS</a:t>
+            </a:r>
+            <a:endParaRPr lang="en-GB" dirty="0"/>
+          </a:p>
+          <a:p>
+            <a:pPr lvl="1"/>
+            <a:endParaRPr lang="en-GB" dirty="0"/>
+          </a:p>
+        </p:txBody>
+      </p:sp>
+    </p:spTree>
+    <p:extLst>
+      <p:ext uri="{BB962C8B-B14F-4D97-AF65-F5344CB8AC3E}">
+        <p14:creationId xmlns:p14="http://schemas.microsoft.com/office/powerpoint/2010/main" val="1089614128"/>
+      </p:ext>
+    </p:extLst>
+  </p:cSld>
+  <p:clrMapOvr>
+    <a:masterClrMapping/>
+  </p:clrMapOvr>
+  <p:timing>
+    <p:tnLst>
+      <p:par>
+        <p:cTn id="1" dur="indefinite" restart="never" nodeType="tmRoot"/>
+      </p:par>
+    </p:tnLst>
+  </p:timing>
+</p:sld>
+</file>
+
+<file path=ppt/slides/slide9.xml><?xml version="1.0" encoding="utf-8"?>
 <p:sld xmlns:a="http://schemas.openxmlformats.org/drawingml/2006/main" xmlns:r="http://schemas.openxmlformats.org/officeDocument/2006/relationships" xmlns:p="http://schemas.openxmlformats.org/presentationml/2006/main">
   <p:cSld>
     <p:spTree>
@@ -3693,36 +4807,49 @@
           <a:lstStyle/>
           <a:p>
             <a:r>
-              <a:rPr lang="en-GB"/>
+              <a:rPr lang="en-GB" dirty="0"/>
               <a:t>Images</a:t>
             </a:r>
           </a:p>
           <a:p>
             <a:r>
-              <a:rPr lang="en-GB"/>
+              <a:rPr lang="en-GB" dirty="0"/>
               <a:t>3D models</a:t>
             </a:r>
           </a:p>
           <a:p>
             <a:r>
-              <a:rPr lang="en-GB"/>
+              <a:rPr lang="en-GB" dirty="0"/>
               <a:t>Compression effects</a:t>
             </a:r>
           </a:p>
           <a:p>
             <a:r>
-              <a:rPr lang="en-GB"/>
-              <a:t>Reconstruction algorithms?</a:t>
-            </a:r>
-          </a:p>
-          <a:p>
-            <a:r>
-              <a:rPr lang="en-GB"/>
+              <a:rPr lang="en-GB" dirty="0"/>
+              <a:t>Reconstruction </a:t>
+            </a:r>
+            <a:r>
+              <a:rPr lang="en-GB" dirty="0" smtClean="0"/>
+              <a:t>algorithms (which </a:t>
+            </a:r>
+            <a:r>
+              <a:rPr lang="en-GB" dirty="0" err="1" smtClean="0"/>
+              <a:t>algo</a:t>
+            </a:r>
+            <a:r>
+              <a:rPr lang="en-GB" dirty="0" smtClean="0"/>
+              <a:t> under which conditions)</a:t>
+            </a:r>
+            <a:endParaRPr lang="en-GB" dirty="0"/>
+          </a:p>
+          <a:p>
+            <a:r>
+              <a:rPr lang="en-GB" dirty="0"/>
               <a:t>Profiling</a:t>
             </a:r>
           </a:p>
           <a:p>
-            <a:endParaRPr lang="en-GB"/>
+            <a:endParaRPr lang="en-GB" dirty="0"/>
           </a:p>
         </p:txBody>
       </p:sp>
@@ -3730,417 +4857,6 @@
     <p:extLst>
       <p:ext uri="{BB962C8B-B14F-4D97-AF65-F5344CB8AC3E}">
         <p14:creationId xmlns:p14="http://schemas.microsoft.com/office/powerpoint/2010/main" val="1576769621"/>
-      </p:ext>
-    </p:extLst>
-  </p:cSld>
-  <p:clrMapOvr>
-    <a:masterClrMapping/>
-  </p:clrMapOvr>
-</p:sld>
-</file>
-
-<file path=ppt/slides/slide6.xml><?xml version="1.0" encoding="utf-8"?>
-<p:sld xmlns:a="http://schemas.openxmlformats.org/drawingml/2006/main" xmlns:r="http://schemas.openxmlformats.org/officeDocument/2006/relationships" xmlns:p="http://schemas.openxmlformats.org/presentationml/2006/main">
-  <p:cSld>
-    <p:spTree>
-      <p:nvGrpSpPr>
-        <p:cNvPr id="1" name=""/>
-        <p:cNvGrpSpPr/>
-        <p:nvPr/>
-      </p:nvGrpSpPr>
-      <p:grpSpPr>
-        <a:xfrm>
-          <a:off x="0" y="0"/>
-          <a:ext cx="0" cy="0"/>
-          <a:chOff x="0" y="0"/>
-          <a:chExt cx="0" cy="0"/>
-        </a:xfrm>
-      </p:grpSpPr>
-      <p:pic>
-        <p:nvPicPr>
-          <p:cNvPr id="4" name="Grafik 3">
-            <a:extLst>
-              <a:ext uri="{FF2B5EF4-FFF2-40B4-BE49-F238E27FC236}">
-                <a16:creationId xmlns:a16="http://schemas.microsoft.com/office/drawing/2014/main" id="{9046EEE0-7BE1-4BBE-9175-4835F2B03910}"/>
-              </a:ext>
-            </a:extLst>
-          </p:cNvPr>
-          <p:cNvPicPr>
-            <a:picLocks noChangeAspect="1"/>
-          </p:cNvPicPr>
-          <p:nvPr/>
-        </p:nvPicPr>
-        <p:blipFill rotWithShape="1">
-          <a:blip r:embed="rId2">
-            <a:alphaModFix amt="30000"/>
-            <a:extLst>
-              <a:ext uri="{28A0092B-C50C-407E-A947-70E740481C1C}">
-                <a14:useLocalDpi xmlns:a14="http://schemas.microsoft.com/office/drawing/2010/main" val="0"/>
-              </a:ext>
-            </a:extLst>
-          </a:blip>
-          <a:srcRect l="30534" r="22575"/>
-          <a:stretch/>
-        </p:blipFill>
-        <p:spPr>
-          <a:xfrm rot="16200000">
-            <a:off x="2667000" y="-2667000"/>
-            <a:ext cx="6858000" cy="12191999"/>
-          </a:xfrm>
-          <a:prstGeom prst="rect">
-            <a:avLst/>
-          </a:prstGeom>
-        </p:spPr>
-      </p:pic>
-      <p:sp>
-        <p:nvSpPr>
-          <p:cNvPr id="2" name="Titel 1">
-            <a:extLst>
-              <a:ext uri="{FF2B5EF4-FFF2-40B4-BE49-F238E27FC236}">
-                <a16:creationId xmlns:a16="http://schemas.microsoft.com/office/drawing/2014/main" id="{30335016-F4C5-4F79-84AD-0E2E926CB1A3}"/>
-              </a:ext>
-            </a:extLst>
-          </p:cNvPr>
-          <p:cNvSpPr>
-            <a:spLocks noGrp="1"/>
-          </p:cNvSpPr>
-          <p:nvPr>
-            <p:ph type="title"/>
-          </p:nvPr>
-        </p:nvSpPr>
-        <p:spPr/>
-        <p:txBody>
-          <a:bodyPr/>
-          <a:lstStyle/>
-          <a:p>
-            <a:r>
-              <a:rPr lang="en-GB"/>
-              <a:t>Conclusion</a:t>
-            </a:r>
-          </a:p>
-        </p:txBody>
-      </p:sp>
-      <p:sp>
-        <p:nvSpPr>
-          <p:cNvPr id="3" name="Inhaltsplatzhalter 2">
-            <a:extLst>
-              <a:ext uri="{FF2B5EF4-FFF2-40B4-BE49-F238E27FC236}">
-                <a16:creationId xmlns:a16="http://schemas.microsoft.com/office/drawing/2014/main" id="{E7B267B8-8804-4D01-8DD3-014B8AF16ECD}"/>
-              </a:ext>
-            </a:extLst>
-          </p:cNvPr>
-          <p:cNvSpPr>
-            <a:spLocks noGrp="1"/>
-          </p:cNvSpPr>
-          <p:nvPr>
-            <p:ph idx="1"/>
-          </p:nvPr>
-        </p:nvSpPr>
-        <p:spPr/>
-        <p:txBody>
-          <a:bodyPr/>
-          <a:lstStyle/>
-          <a:p>
-            <a:r>
-              <a:rPr lang="en-GB" dirty="0"/>
-              <a:t>Compression reduced data substantially, JPEG2000 </a:t>
-            </a:r>
-            <a:r>
-              <a:rPr lang="en-GB"/>
-              <a:t>works well</a:t>
-            </a:r>
-          </a:p>
-          <a:p>
-            <a:r>
-              <a:rPr lang="en-GB" dirty="0"/>
-              <a:t>First step</a:t>
-            </a:r>
-          </a:p>
-          <a:p>
-            <a:r>
-              <a:rPr lang="en-GB" dirty="0"/>
-              <a:t>Many things to do</a:t>
-            </a:r>
-          </a:p>
-          <a:p>
-            <a:endParaRPr lang="en-GB" dirty="0"/>
-          </a:p>
-        </p:txBody>
-      </p:sp>
-    </p:spTree>
-    <p:extLst>
-      <p:ext uri="{BB962C8B-B14F-4D97-AF65-F5344CB8AC3E}">
-        <p14:creationId xmlns:p14="http://schemas.microsoft.com/office/powerpoint/2010/main" val="3396096290"/>
-      </p:ext>
-    </p:extLst>
-  </p:cSld>
-  <p:clrMapOvr>
-    <a:masterClrMapping/>
-  </p:clrMapOvr>
-</p:sld>
-</file>
-
-<file path=ppt/slides/slide7.xml><?xml version="1.0" encoding="utf-8"?>
-<p:sld xmlns:a="http://schemas.openxmlformats.org/drawingml/2006/main" xmlns:r="http://schemas.openxmlformats.org/officeDocument/2006/relationships" xmlns:p="http://schemas.openxmlformats.org/presentationml/2006/main">
-  <p:cSld>
-    <p:spTree>
-      <p:nvGrpSpPr>
-        <p:cNvPr id="1" name=""/>
-        <p:cNvGrpSpPr/>
-        <p:nvPr/>
-      </p:nvGrpSpPr>
-      <p:grpSpPr>
-        <a:xfrm>
-          <a:off x="0" y="0"/>
-          <a:ext cx="0" cy="0"/>
-          <a:chOff x="0" y="0"/>
-          <a:chExt cx="0" cy="0"/>
-        </a:xfrm>
-      </p:grpSpPr>
-      <p:pic>
-        <p:nvPicPr>
-          <p:cNvPr id="6" name="Grafik 5">
-            <a:extLst>
-              <a:ext uri="{FF2B5EF4-FFF2-40B4-BE49-F238E27FC236}">
-                <a16:creationId xmlns:a16="http://schemas.microsoft.com/office/drawing/2014/main" id="{90ADB998-D45D-4EB8-B168-1ED0EA096B07}"/>
-              </a:ext>
-            </a:extLst>
-          </p:cNvPr>
-          <p:cNvPicPr>
-            <a:picLocks noChangeAspect="1"/>
-          </p:cNvPicPr>
-          <p:nvPr/>
-        </p:nvPicPr>
-        <p:blipFill rotWithShape="1">
-          <a:blip r:embed="rId2">
-            <a:extLst>
-              <a:ext uri="{28A0092B-C50C-407E-A947-70E740481C1C}">
-                <a14:useLocalDpi xmlns:a14="http://schemas.microsoft.com/office/drawing/2010/main" val="0"/>
-              </a:ext>
-            </a:extLst>
-          </a:blip>
-          <a:srcRect l="30534" r="22575"/>
-          <a:stretch/>
-        </p:blipFill>
-        <p:spPr>
-          <a:xfrm rot="16200000">
-            <a:off x="2667000" y="-2667000"/>
-            <a:ext cx="6858000" cy="12191999"/>
-          </a:xfrm>
-          <a:prstGeom prst="rect">
-            <a:avLst/>
-          </a:prstGeom>
-        </p:spPr>
-      </p:pic>
-      <p:sp>
-        <p:nvSpPr>
-          <p:cNvPr id="4" name="Titel 3">
-            <a:extLst>
-              <a:ext uri="{FF2B5EF4-FFF2-40B4-BE49-F238E27FC236}">
-                <a16:creationId xmlns:a16="http://schemas.microsoft.com/office/drawing/2014/main" id="{8576ECCA-FD84-45FC-8522-2C9E116540E1}"/>
-              </a:ext>
-            </a:extLst>
-          </p:cNvPr>
-          <p:cNvSpPr>
-            <a:spLocks noGrp="1"/>
-          </p:cNvSpPr>
-          <p:nvPr>
-            <p:ph type="ctrTitle"/>
-          </p:nvPr>
-        </p:nvSpPr>
-        <p:spPr>
-          <a:xfrm>
-            <a:off x="1524000" y="3792411"/>
-            <a:ext cx="9144000" cy="2387600"/>
-          </a:xfrm>
-        </p:spPr>
-        <p:txBody>
-          <a:bodyPr/>
-          <a:lstStyle/>
-          <a:p>
-            <a:r>
-              <a:rPr lang="de-DE" dirty="0" err="1"/>
-              <a:t>Thank</a:t>
-            </a:r>
-            <a:r>
-              <a:rPr lang="de-DE" dirty="0"/>
-              <a:t> you for your </a:t>
-            </a:r>
-            <a:r>
-              <a:rPr lang="de-DE" dirty="0" err="1"/>
-              <a:t>attention</a:t>
-            </a:r>
-            <a:r>
-              <a:rPr lang="de-DE" dirty="0"/>
-              <a:t>!</a:t>
-            </a:r>
-          </a:p>
-        </p:txBody>
-      </p:sp>
-    </p:spTree>
-    <p:extLst>
-      <p:ext uri="{BB962C8B-B14F-4D97-AF65-F5344CB8AC3E}">
-        <p14:creationId xmlns:p14="http://schemas.microsoft.com/office/powerpoint/2010/main" val="936038027"/>
-      </p:ext>
-    </p:extLst>
-  </p:cSld>
-  <p:clrMapOvr>
-    <a:masterClrMapping/>
-  </p:clrMapOvr>
-</p:sld>
-</file>
-
-<file path=ppt/slides/slide8.xml><?xml version="1.0" encoding="utf-8"?>
-<p:sld xmlns:a="http://schemas.openxmlformats.org/drawingml/2006/main" xmlns:r="http://schemas.openxmlformats.org/officeDocument/2006/relationships" xmlns:p="http://schemas.openxmlformats.org/presentationml/2006/main">
-  <p:cSld>
-    <p:spTree>
-      <p:nvGrpSpPr>
-        <p:cNvPr id="1" name=""/>
-        <p:cNvGrpSpPr/>
-        <p:nvPr/>
-      </p:nvGrpSpPr>
-      <p:grpSpPr>
-        <a:xfrm>
-          <a:off x="0" y="0"/>
-          <a:ext cx="0" cy="0"/>
-          <a:chOff x="0" y="0"/>
-          <a:chExt cx="0" cy="0"/>
-        </a:xfrm>
-      </p:grpSpPr>
-      <p:sp>
-        <p:nvSpPr>
-          <p:cNvPr id="2" name="Titel 1">
-            <a:extLst>
-              <a:ext uri="{FF2B5EF4-FFF2-40B4-BE49-F238E27FC236}">
-                <a16:creationId xmlns:a16="http://schemas.microsoft.com/office/drawing/2014/main" id="{E415FEDB-10C4-4548-8210-BDC1473B05A4}"/>
-              </a:ext>
-            </a:extLst>
-          </p:cNvPr>
-          <p:cNvSpPr>
-            <a:spLocks noGrp="1"/>
-          </p:cNvSpPr>
-          <p:nvPr>
-            <p:ph type="title"/>
-          </p:nvPr>
-        </p:nvSpPr>
-        <p:spPr/>
-        <p:txBody>
-          <a:bodyPr/>
-          <a:lstStyle/>
-          <a:p>
-            <a:endParaRPr lang="de-DE"/>
-          </a:p>
-        </p:txBody>
-      </p:sp>
-      <p:sp>
-        <p:nvSpPr>
-          <p:cNvPr id="3" name="Inhaltsplatzhalter 2">
-            <a:extLst>
-              <a:ext uri="{FF2B5EF4-FFF2-40B4-BE49-F238E27FC236}">
-                <a16:creationId xmlns:a16="http://schemas.microsoft.com/office/drawing/2014/main" id="{5E54993C-399B-4BEC-899A-A8D211C084E4}"/>
-              </a:ext>
-            </a:extLst>
-          </p:cNvPr>
-          <p:cNvSpPr>
-            <a:spLocks noGrp="1"/>
-          </p:cNvSpPr>
-          <p:nvPr>
-            <p:ph idx="1"/>
-          </p:nvPr>
-        </p:nvSpPr>
-        <p:spPr/>
-        <p:txBody>
-          <a:bodyPr/>
-          <a:lstStyle/>
-          <a:p>
-            <a:endParaRPr lang="de-DE" dirty="0"/>
-          </a:p>
-        </p:txBody>
-      </p:sp>
-    </p:spTree>
-    <p:extLst>
-      <p:ext uri="{BB962C8B-B14F-4D97-AF65-F5344CB8AC3E}">
-        <p14:creationId xmlns:p14="http://schemas.microsoft.com/office/powerpoint/2010/main" val="184944192"/>
-      </p:ext>
-    </p:extLst>
-  </p:cSld>
-  <p:clrMapOvr>
-    <a:masterClrMapping/>
-  </p:clrMapOvr>
-</p:sld>
-</file>
-
-<file path=ppt/slides/slide9.xml><?xml version="1.0" encoding="utf-8"?>
-<p:sld xmlns:a="http://schemas.openxmlformats.org/drawingml/2006/main" xmlns:r="http://schemas.openxmlformats.org/officeDocument/2006/relationships" xmlns:p="http://schemas.openxmlformats.org/presentationml/2006/main">
-  <p:cSld>
-    <p:spTree>
-      <p:nvGrpSpPr>
-        <p:cNvPr id="1" name=""/>
-        <p:cNvGrpSpPr/>
-        <p:nvPr/>
-      </p:nvGrpSpPr>
-      <p:grpSpPr>
-        <a:xfrm>
-          <a:off x="0" y="0"/>
-          <a:ext cx="0" cy="0"/>
-          <a:chOff x="0" y="0"/>
-          <a:chExt cx="0" cy="0"/>
-        </a:xfrm>
-      </p:grpSpPr>
-      <p:sp>
-        <p:nvSpPr>
-          <p:cNvPr id="2" name="Titel 1">
-            <a:extLst>
-              <a:ext uri="{FF2B5EF4-FFF2-40B4-BE49-F238E27FC236}">
-                <a16:creationId xmlns:a16="http://schemas.microsoft.com/office/drawing/2014/main" id="{857CE1A7-DBFF-49C2-829B-F57575180AFB}"/>
-              </a:ext>
-            </a:extLst>
-          </p:cNvPr>
-          <p:cNvSpPr>
-            <a:spLocks noGrp="1"/>
-          </p:cNvSpPr>
-          <p:nvPr>
-            <p:ph type="title"/>
-          </p:nvPr>
-        </p:nvSpPr>
-        <p:spPr/>
-        <p:txBody>
-          <a:bodyPr/>
-          <a:lstStyle/>
-          <a:p>
-            <a:endParaRPr lang="de-DE"/>
-          </a:p>
-        </p:txBody>
-      </p:sp>
-      <p:sp>
-        <p:nvSpPr>
-          <p:cNvPr id="3" name="Inhaltsplatzhalter 2">
-            <a:extLst>
-              <a:ext uri="{FF2B5EF4-FFF2-40B4-BE49-F238E27FC236}">
-                <a16:creationId xmlns:a16="http://schemas.microsoft.com/office/drawing/2014/main" id="{1491A94B-662B-495C-A782-A033DADB4D95}"/>
-              </a:ext>
-            </a:extLst>
-          </p:cNvPr>
-          <p:cNvSpPr>
-            <a:spLocks noGrp="1"/>
-          </p:cNvSpPr>
-          <p:nvPr>
-            <p:ph idx="1"/>
-          </p:nvPr>
-        </p:nvSpPr>
-        <p:spPr/>
-        <p:txBody>
-          <a:bodyPr/>
-          <a:lstStyle/>
-          <a:p>
-            <a:endParaRPr lang="de-DE"/>
-          </a:p>
-        </p:txBody>
-      </p:sp>
-    </p:spTree>
-    <p:extLst>
-      <p:ext uri="{BB962C8B-B14F-4D97-AF65-F5344CB8AC3E}">
-        <p14:creationId xmlns:p14="http://schemas.microsoft.com/office/powerpoint/2010/main" val="174998524"/>
       </p:ext>
     </p:extLst>
   </p:cSld>

</xml_diff>